<commit_message>
Update before modifying figures for publication to make selection gradients more apparent
</commit_message>
<xml_diff>
--- a/Selection_Figures/PathSurvNew.pptx
+++ b/Selection_Figures/PathSurvNew.pptx
@@ -308,7 +308,7 @@
           <a:p>
             <a:fld id="{E6744CE3-0875-4B69-89C0-6F72D8139561}" type="datetimeFigureOut">
               <a:rPr lang="en-GB" smtClean="0"/>
-              <a:t>25/02/2021</a:t>
+              <a:t>13/04/2021</a:t>
             </a:fld>
             <a:endParaRPr lang="en-GB"/>
           </a:p>
@@ -478,7 +478,7 @@
           <a:p>
             <a:fld id="{E6744CE3-0875-4B69-89C0-6F72D8139561}" type="datetimeFigureOut">
               <a:rPr lang="en-GB" smtClean="0"/>
-              <a:t>25/02/2021</a:t>
+              <a:t>13/04/2021</a:t>
             </a:fld>
             <a:endParaRPr lang="en-GB"/>
           </a:p>
@@ -724,7 +724,7 @@
           <a:p>
             <a:fld id="{E6744CE3-0875-4B69-89C0-6F72D8139561}" type="datetimeFigureOut">
               <a:rPr lang="en-GB" smtClean="0"/>
-              <a:t>25/02/2021</a:t>
+              <a:t>13/04/2021</a:t>
             </a:fld>
             <a:endParaRPr lang="en-GB"/>
           </a:p>
@@ -1012,7 +1012,7 @@
           <a:p>
             <a:fld id="{E6744CE3-0875-4B69-89C0-6F72D8139561}" type="datetimeFigureOut">
               <a:rPr lang="en-GB" smtClean="0"/>
-              <a:t>25/02/2021</a:t>
+              <a:t>13/04/2021</a:t>
             </a:fld>
             <a:endParaRPr lang="en-GB"/>
           </a:p>
@@ -1434,7 +1434,7 @@
           <a:p>
             <a:fld id="{E6744CE3-0875-4B69-89C0-6F72D8139561}" type="datetimeFigureOut">
               <a:rPr lang="en-GB" smtClean="0"/>
-              <a:t>25/02/2021</a:t>
+              <a:t>13/04/2021</a:t>
             </a:fld>
             <a:endParaRPr lang="en-GB"/>
           </a:p>
@@ -1552,7 +1552,7 @@
           <a:p>
             <a:fld id="{E6744CE3-0875-4B69-89C0-6F72D8139561}" type="datetimeFigureOut">
               <a:rPr lang="en-GB" smtClean="0"/>
-              <a:t>25/02/2021</a:t>
+              <a:t>13/04/2021</a:t>
             </a:fld>
             <a:endParaRPr lang="en-GB"/>
           </a:p>
@@ -1647,7 +1647,7 @@
           <a:p>
             <a:fld id="{E6744CE3-0875-4B69-89C0-6F72D8139561}" type="datetimeFigureOut">
               <a:rPr lang="en-GB" smtClean="0"/>
-              <a:t>25/02/2021</a:t>
+              <a:t>13/04/2021</a:t>
             </a:fld>
             <a:endParaRPr lang="en-GB"/>
           </a:p>
@@ -1860,7 +1860,7 @@
           <a:p>
             <a:fld id="{E6744CE3-0875-4B69-89C0-6F72D8139561}" type="datetimeFigureOut">
               <a:rPr lang="en-GB" smtClean="0"/>
-              <a:t>25/02/2021</a:t>
+              <a:t>13/04/2021</a:t>
             </a:fld>
             <a:endParaRPr lang="en-GB"/>
           </a:p>
@@ -3531,8 +3531,8 @@
         </p:nvSpPr>
         <p:spPr>
           <a:xfrm>
-            <a:off x="4734335" y="4890501"/>
-            <a:ext cx="0" cy="1346811"/>
+            <a:off x="4734335" y="5025044"/>
+            <a:ext cx="0" cy="1011879"/>
           </a:xfrm>
           <a:custGeom>
             <a:avLst/>
@@ -3823,7 +3823,7 @@
         </p:nvSpPr>
         <p:spPr>
           <a:xfrm>
-            <a:off x="4644335" y="4713276"/>
+            <a:off x="4644335" y="4869160"/>
             <a:ext cx="180000" cy="155884"/>
           </a:xfrm>
           <a:custGeom>
@@ -4967,7 +4967,7 @@
         </p:nvSpPr>
         <p:spPr>
           <a:xfrm>
-            <a:off x="4399552" y="1165122"/>
+            <a:off x="4355976" y="1165122"/>
             <a:ext cx="388472" cy="103410"/>
           </a:xfrm>
           <a:prstGeom prst="rect">
@@ -4988,6 +4988,18 @@
               </a:spcAft>
             </a:pPr>
             <a:r>
+              <a:rPr lang="en-CA" sz="1400" b="1" dirty="0">
+                <a:solidFill>
+                  <a:srgbClr val="000000">
+                    <a:alpha val="100000"/>
+                  </a:srgbClr>
+                </a:solidFill>
+                <a:latin typeface="Times New Roman" panose="02020603050405020304" pitchFamily="18" charset="0"/>
+                <a:cs typeface="Times New Roman" panose="02020603050405020304" pitchFamily="18" charset="0"/>
+              </a:rPr>
+              <a:t>+</a:t>
+            </a:r>
+            <a:r>
               <a:rPr sz="1400" b="1" dirty="0">
                 <a:solidFill>
                   <a:srgbClr val="000000">
@@ -4997,7 +5009,7 @@
                 <a:latin typeface="Times New Roman" panose="02020603050405020304" pitchFamily="18" charset="0"/>
                 <a:cs typeface="Times New Roman" panose="02020603050405020304" pitchFamily="18" charset="0"/>
               </a:rPr>
-              <a:t>0.41 ***</a:t>
+              <a:t>0.41***</a:t>
             </a:r>
           </a:p>
         </p:txBody>
@@ -5040,7 +5052,7 @@
                 <a:latin typeface="Times New Roman" panose="02020603050405020304" pitchFamily="18" charset="0"/>
                 <a:cs typeface="Times New Roman" panose="02020603050405020304" pitchFamily="18" charset="0"/>
               </a:rPr>
-              <a:t>-0.18 ***</a:t>
+              <a:t>-0.18***</a:t>
             </a:r>
           </a:p>
         </p:txBody>
@@ -5083,7 +5095,7 @@
                 <a:latin typeface="Times New Roman" panose="02020603050405020304" pitchFamily="18" charset="0"/>
                 <a:cs typeface="Times New Roman" panose="02020603050405020304" pitchFamily="18" charset="0"/>
               </a:rPr>
-              <a:t>-0.49 ***</a:t>
+              <a:t>-0.49***</a:t>
             </a:r>
           </a:p>
         </p:txBody>
@@ -5096,7 +5108,7 @@
         </p:nvSpPr>
         <p:spPr>
           <a:xfrm>
-            <a:off x="6112410" y="1700808"/>
+            <a:off x="6084168" y="1700808"/>
             <a:ext cx="299386" cy="103410"/>
           </a:xfrm>
           <a:prstGeom prst="rect">
@@ -5117,6 +5129,18 @@
               </a:spcAft>
             </a:pPr>
             <a:r>
+              <a:rPr lang="en-CA" sz="1400" b="1" dirty="0">
+                <a:solidFill>
+                  <a:srgbClr val="000000">
+                    <a:alpha val="100000"/>
+                  </a:srgbClr>
+                </a:solidFill>
+                <a:latin typeface="Times New Roman" panose="02020603050405020304" pitchFamily="18" charset="0"/>
+                <a:cs typeface="Times New Roman" panose="02020603050405020304" pitchFamily="18" charset="0"/>
+              </a:rPr>
+              <a:t>+</a:t>
+            </a:r>
+            <a:r>
               <a:rPr sz="1400" b="1" dirty="0">
                 <a:solidFill>
                   <a:srgbClr val="000000">
@@ -5126,7 +5150,7 @@
                 <a:latin typeface="Times New Roman" panose="02020603050405020304" pitchFamily="18" charset="0"/>
                 <a:cs typeface="Times New Roman" panose="02020603050405020304" pitchFamily="18" charset="0"/>
               </a:rPr>
-              <a:t>0.12 *</a:t>
+              <a:t>0.12*</a:t>
             </a:r>
           </a:p>
         </p:txBody>
@@ -5160,6 +5184,18 @@
               </a:spcAft>
             </a:pPr>
             <a:r>
+              <a:rPr lang="en-CA" sz="1400" b="1" dirty="0">
+                <a:solidFill>
+                  <a:srgbClr val="000000">
+                    <a:alpha val="100000"/>
+                  </a:srgbClr>
+                </a:solidFill>
+                <a:latin typeface="Times New Roman" panose="02020603050405020304" pitchFamily="18" charset="0"/>
+                <a:cs typeface="Times New Roman" panose="02020603050405020304" pitchFamily="18" charset="0"/>
+              </a:rPr>
+              <a:t>+</a:t>
+            </a:r>
+            <a:r>
               <a:rPr sz="1400" b="1" dirty="0">
                 <a:solidFill>
                   <a:srgbClr val="000000">
@@ -5169,7 +5205,7 @@
                 <a:latin typeface="Times New Roman" panose="02020603050405020304" pitchFamily="18" charset="0"/>
                 <a:cs typeface="Times New Roman" panose="02020603050405020304" pitchFamily="18" charset="0"/>
               </a:rPr>
-              <a:t>0.27 *</a:t>
+              <a:t>0.27*</a:t>
             </a:r>
           </a:p>
         </p:txBody>
@@ -5212,7 +5248,7 @@
                 <a:latin typeface="Times New Roman" panose="02020603050405020304" pitchFamily="18" charset="0"/>
                 <a:cs typeface="Times New Roman" panose="02020603050405020304" pitchFamily="18" charset="0"/>
               </a:rPr>
-              <a:t>-0.37 *</a:t>
+              <a:t>-0.37*</a:t>
             </a:r>
           </a:p>
         </p:txBody>
@@ -5268,7 +5304,7 @@
         </p:nvSpPr>
         <p:spPr>
           <a:xfrm>
-            <a:off x="3302770" y="2825628"/>
+            <a:off x="3302770" y="2780928"/>
             <a:ext cx="261118" cy="102114"/>
           </a:xfrm>
           <a:prstGeom prst="rect">
@@ -5789,7 +5825,7 @@
         </p:nvSpPr>
         <p:spPr>
           <a:xfrm>
-            <a:off x="4515531" y="6323830"/>
+            <a:off x="4515531" y="6123441"/>
             <a:ext cx="444855" cy="273522"/>
           </a:xfrm>
           <a:custGeom>
@@ -5985,7 +6021,7 @@
         </p:nvSpPr>
         <p:spPr>
           <a:xfrm>
-            <a:off x="4616566" y="6323831"/>
+            <a:off x="4616566" y="6123442"/>
             <a:ext cx="218186" cy="201514"/>
           </a:xfrm>
           <a:prstGeom prst="rect">
@@ -6028,8 +6064,8 @@
         </p:nvSpPr>
         <p:spPr>
           <a:xfrm>
-            <a:off x="4262045" y="4212624"/>
-            <a:ext cx="944578" cy="440512"/>
+            <a:off x="4042856" y="4245316"/>
+            <a:ext cx="1382957" cy="484563"/>
           </a:xfrm>
           <a:custGeom>
             <a:avLst/>
@@ -6224,7 +6260,7 @@
         </p:nvSpPr>
         <p:spPr>
           <a:xfrm>
-            <a:off x="4324703" y="4190943"/>
+            <a:off x="4324703" y="4275873"/>
             <a:ext cx="823361" cy="462193"/>
           </a:xfrm>
           <a:prstGeom prst="rect">
@@ -6236,7 +6272,7 @@
           <a:bodyPr wrap="none" lIns="0" tIns="0" rIns="0" bIns="0" anchor="ctr" anchorCtr="1"/>
           <a:lstStyle/>
           <a:p>
-            <a:pPr marL="0" marR="0" indent="0" algn="l">
+            <a:pPr marL="0" marR="0" indent="0" algn="ctr">
               <a:spcBef>
                 <a:spcPts val="0"/>
               </a:spcBef>
@@ -6244,6 +6280,18 @@
                 <a:spcPts val="0"/>
               </a:spcAft>
             </a:pPr>
+            <a:r>
+              <a:rPr lang="en-CA" sz="1400" b="1" i="1" dirty="0">
+                <a:solidFill>
+                  <a:srgbClr val="000000">
+                    <a:alpha val="100000"/>
+                  </a:srgbClr>
+                </a:solidFill>
+                <a:latin typeface="Times New Roman" panose="02020603050405020304" pitchFamily="18" charset="0"/>
+                <a:cs typeface="Times New Roman" panose="02020603050405020304" pitchFamily="18" charset="0"/>
+              </a:rPr>
+              <a:t>Alliaria petiolata</a:t>
+            </a:r>
             <a:r>
               <a:rPr sz="1400" b="1" dirty="0">
                 <a:solidFill>
@@ -6254,7 +6302,7 @@
                 <a:latin typeface="Times New Roman" panose="02020603050405020304" pitchFamily="18" charset="0"/>
                 <a:cs typeface="Times New Roman" panose="02020603050405020304" pitchFamily="18" charset="0"/>
               </a:rPr>
-              <a:t>Relative </a:t>
+              <a:t> </a:t>
             </a:r>
             <a:endParaRPr lang="en-CA" sz="1400" b="1" dirty="0">
               <a:solidFill>
@@ -6267,7 +6315,7 @@
             </a:endParaRPr>
           </a:p>
           <a:p>
-            <a:pPr marL="0" marR="0" indent="0" algn="l">
+            <a:pPr marL="0" marR="0" indent="0" algn="ctr">
               <a:spcBef>
                 <a:spcPts val="0"/>
               </a:spcBef>
@@ -6984,7 +7032,7 @@
         </p:nvSpPr>
         <p:spPr>
           <a:xfrm>
-            <a:off x="2142089" y="3393916"/>
+            <a:off x="2123728" y="3424901"/>
             <a:ext cx="343929" cy="76107"/>
           </a:xfrm>
           <a:prstGeom prst="rect">
@@ -7005,6 +7053,18 @@
               </a:spcAft>
             </a:pPr>
             <a:r>
+              <a:rPr lang="en-CA" sz="1400" b="1" dirty="0">
+                <a:solidFill>
+                  <a:srgbClr val="000000">
+                    <a:alpha val="100000"/>
+                  </a:srgbClr>
+                </a:solidFill>
+                <a:latin typeface="Times New Roman" panose="02020603050405020304" pitchFamily="18" charset="0"/>
+                <a:cs typeface="Times New Roman" panose="02020603050405020304" pitchFamily="18" charset="0"/>
+              </a:rPr>
+              <a:t>+</a:t>
+            </a:r>
+            <a:r>
               <a:rPr sz="1400" b="1" dirty="0">
                 <a:solidFill>
                   <a:srgbClr val="000000">
@@ -7014,7 +7074,7 @@
                 <a:latin typeface="Times New Roman" panose="02020603050405020304" pitchFamily="18" charset="0"/>
                 <a:cs typeface="Times New Roman" panose="02020603050405020304" pitchFamily="18" charset="0"/>
               </a:rPr>
-              <a:t>0.07 **</a:t>
+              <a:t>0.07**</a:t>
             </a:r>
           </a:p>
         </p:txBody>
@@ -7063,7 +7123,7 @@
                 <a:latin typeface="Times New Roman" panose="02020603050405020304" pitchFamily="18" charset="0"/>
                 <a:cs typeface="Times New Roman" panose="02020603050405020304" pitchFamily="18" charset="0"/>
               </a:rPr>
-              <a:t>-0.05 *</a:t>
+              <a:t>-0.05*</a:t>
             </a:r>
           </a:p>
         </p:txBody>
@@ -7082,7 +7142,7 @@
         </p:nvSpPr>
         <p:spPr>
           <a:xfrm rot="20112026">
-            <a:off x="3809178" y="4176546"/>
+            <a:off x="3737170" y="4160751"/>
             <a:ext cx="169853" cy="176887"/>
           </a:xfrm>
           <a:custGeom>
@@ -7146,7 +7206,7 @@
         </p:nvSpPr>
         <p:spPr>
           <a:xfrm rot="1167409">
-            <a:off x="5457656" y="4172318"/>
+            <a:off x="5528430" y="4160750"/>
             <a:ext cx="169853" cy="176887"/>
           </a:xfrm>
           <a:custGeom>

</xml_diff>

<commit_message>
fixed path analysis images
</commit_message>
<xml_diff>
--- a/Selection_Figures/PathSurvNew.pptx
+++ b/Selection_Figures/PathSurvNew.pptx
@@ -308,7 +308,7 @@
           <a:p>
             <a:fld id="{E6744CE3-0875-4B69-89C0-6F72D8139561}" type="datetimeFigureOut">
               <a:rPr lang="en-GB" smtClean="0"/>
-              <a:t>13/04/2021</a:t>
+              <a:t>07/04/2022</a:t>
             </a:fld>
             <a:endParaRPr lang="en-GB"/>
           </a:p>
@@ -478,7 +478,7 @@
           <a:p>
             <a:fld id="{E6744CE3-0875-4B69-89C0-6F72D8139561}" type="datetimeFigureOut">
               <a:rPr lang="en-GB" smtClean="0"/>
-              <a:t>13/04/2021</a:t>
+              <a:t>07/04/2022</a:t>
             </a:fld>
             <a:endParaRPr lang="en-GB"/>
           </a:p>
@@ -724,7 +724,7 @@
           <a:p>
             <a:fld id="{E6744CE3-0875-4B69-89C0-6F72D8139561}" type="datetimeFigureOut">
               <a:rPr lang="en-GB" smtClean="0"/>
-              <a:t>13/04/2021</a:t>
+              <a:t>07/04/2022</a:t>
             </a:fld>
             <a:endParaRPr lang="en-GB"/>
           </a:p>
@@ -1012,7 +1012,7 @@
           <a:p>
             <a:fld id="{E6744CE3-0875-4B69-89C0-6F72D8139561}" type="datetimeFigureOut">
               <a:rPr lang="en-GB" smtClean="0"/>
-              <a:t>13/04/2021</a:t>
+              <a:t>07/04/2022</a:t>
             </a:fld>
             <a:endParaRPr lang="en-GB"/>
           </a:p>
@@ -1434,7 +1434,7 @@
           <a:p>
             <a:fld id="{E6744CE3-0875-4B69-89C0-6F72D8139561}" type="datetimeFigureOut">
               <a:rPr lang="en-GB" smtClean="0"/>
-              <a:t>13/04/2021</a:t>
+              <a:t>07/04/2022</a:t>
             </a:fld>
             <a:endParaRPr lang="en-GB"/>
           </a:p>
@@ -1552,7 +1552,7 @@
           <a:p>
             <a:fld id="{E6744CE3-0875-4B69-89C0-6F72D8139561}" type="datetimeFigureOut">
               <a:rPr lang="en-GB" smtClean="0"/>
-              <a:t>13/04/2021</a:t>
+              <a:t>07/04/2022</a:t>
             </a:fld>
             <a:endParaRPr lang="en-GB"/>
           </a:p>
@@ -1647,7 +1647,7 @@
           <a:p>
             <a:fld id="{E6744CE3-0875-4B69-89C0-6F72D8139561}" type="datetimeFigureOut">
               <a:rPr lang="en-GB" smtClean="0"/>
-              <a:t>13/04/2021</a:t>
+              <a:t>07/04/2022</a:t>
             </a:fld>
             <a:endParaRPr lang="en-GB"/>
           </a:p>
@@ -1860,7 +1860,7 @@
           <a:p>
             <a:fld id="{E6744CE3-0875-4B69-89C0-6F72D8139561}" type="datetimeFigureOut">
               <a:rPr lang="en-GB" smtClean="0"/>
-              <a:t>13/04/2021</a:t>
+              <a:t>07/04/2022</a:t>
             </a:fld>
             <a:endParaRPr lang="en-GB"/>
           </a:p>
@@ -5347,8 +5347,8 @@
         </p:nvSpPr>
         <p:spPr>
           <a:xfrm>
-            <a:off x="3078320" y="227816"/>
-            <a:ext cx="1299266" cy="267035"/>
+            <a:off x="2957563" y="100742"/>
+            <a:ext cx="1398413" cy="440667"/>
           </a:xfrm>
           <a:custGeom>
             <a:avLst/>
@@ -5543,7 +5543,7 @@
         </p:nvSpPr>
         <p:spPr>
           <a:xfrm>
-            <a:off x="3329965" y="302623"/>
+            <a:off x="3287764" y="228854"/>
             <a:ext cx="795976" cy="129468"/>
           </a:xfrm>
           <a:prstGeom prst="rect">
@@ -5555,7 +5555,29 @@
           <a:bodyPr wrap="none" lIns="0" tIns="0" rIns="0" bIns="0" anchor="ctr" anchorCtr="1"/>
           <a:lstStyle/>
           <a:p>
-            <a:pPr marL="0" marR="0" indent="0" algn="l">
+            <a:pPr marL="0" marR="0" indent="0" algn="ctr">
+              <a:spcBef>
+                <a:spcPts val="0"/>
+              </a:spcBef>
+              <a:spcAft>
+                <a:spcPts val="0"/>
+              </a:spcAft>
+            </a:pPr>
+            <a:r>
+              <a:rPr lang="en-CA" sz="1400" b="1" i="1" dirty="0">
+                <a:solidFill>
+                  <a:srgbClr val="000000">
+                    <a:alpha val="100000"/>
+                  </a:srgbClr>
+                </a:solidFill>
+                <a:latin typeface="Times New Roman" panose="02020603050405020304" pitchFamily="18" charset="0"/>
+                <a:cs typeface="Times New Roman" panose="02020603050405020304" pitchFamily="18" charset="0"/>
+              </a:rPr>
+              <a:t>Acer saccharum </a:t>
+            </a:r>
+          </a:p>
+          <a:p>
+            <a:pPr marL="0" marR="0" indent="0" algn="ctr">
               <a:spcBef>
                 <a:spcPts val="0"/>
               </a:spcBef>
@@ -5573,8 +5595,41 @@
                 <a:latin typeface="Times New Roman" panose="02020603050405020304" pitchFamily="18" charset="0"/>
                 <a:cs typeface="Times New Roman" panose="02020603050405020304" pitchFamily="18" charset="0"/>
               </a:rPr>
-              <a:t>Transplant Size</a:t>
+              <a:t>Transplant </a:t>
             </a:r>
+            <a:r>
+              <a:rPr lang="en-CA" sz="1400" b="1" dirty="0">
+                <a:solidFill>
+                  <a:srgbClr val="000000">
+                    <a:alpha val="100000"/>
+                  </a:srgbClr>
+                </a:solidFill>
+                <a:latin typeface="Times New Roman" panose="02020603050405020304" pitchFamily="18" charset="0"/>
+                <a:cs typeface="Times New Roman" panose="02020603050405020304" pitchFamily="18" charset="0"/>
+              </a:rPr>
+              <a:t>s</a:t>
+            </a:r>
+            <a:r>
+              <a:rPr sz="1400" b="1" dirty="0" err="1">
+                <a:solidFill>
+                  <a:srgbClr val="000000">
+                    <a:alpha val="100000"/>
+                  </a:srgbClr>
+                </a:solidFill>
+                <a:latin typeface="Times New Roman" panose="02020603050405020304" pitchFamily="18" charset="0"/>
+                <a:cs typeface="Times New Roman" panose="02020603050405020304" pitchFamily="18" charset="0"/>
+              </a:rPr>
+              <a:t>ize</a:t>
+            </a:r>
+            <a:endParaRPr sz="1400" b="1" dirty="0">
+              <a:solidFill>
+                <a:srgbClr val="000000">
+                  <a:alpha val="100000"/>
+                </a:srgbClr>
+              </a:solidFill>
+              <a:latin typeface="Times New Roman" panose="02020603050405020304" pitchFamily="18" charset="0"/>
+              <a:cs typeface="Times New Roman" panose="02020603050405020304" pitchFamily="18" charset="0"/>
+            </a:endParaRPr>
           </a:p>
         </p:txBody>
       </p:sp>
@@ -5586,8 +5641,8 @@
         </p:nvSpPr>
         <p:spPr>
           <a:xfrm>
-            <a:off x="5170281" y="227817"/>
-            <a:ext cx="1140871" cy="267035"/>
+            <a:off x="5013509" y="110555"/>
+            <a:ext cx="1309663" cy="440667"/>
           </a:xfrm>
           <a:custGeom>
             <a:avLst/>
@@ -5782,7 +5837,7 @@
         </p:nvSpPr>
         <p:spPr>
           <a:xfrm>
-            <a:off x="5396821" y="305716"/>
+            <a:off x="5336834" y="241693"/>
             <a:ext cx="687790" cy="131105"/>
           </a:xfrm>
           <a:prstGeom prst="rect">
@@ -5794,7 +5849,29 @@
           <a:bodyPr wrap="none" lIns="0" tIns="0" rIns="0" bIns="0" anchor="ctr" anchorCtr="1"/>
           <a:lstStyle/>
           <a:p>
-            <a:pPr marL="0" marR="0" indent="0" algn="l">
+            <a:pPr marL="0" marR="0" indent="0" algn="ctr">
+              <a:spcBef>
+                <a:spcPts val="0"/>
+              </a:spcBef>
+              <a:spcAft>
+                <a:spcPts val="0"/>
+              </a:spcAft>
+            </a:pPr>
+            <a:r>
+              <a:rPr lang="en-CA" sz="1400" b="1" i="1" dirty="0">
+                <a:solidFill>
+                  <a:srgbClr val="000000">
+                    <a:alpha val="100000"/>
+                  </a:srgbClr>
+                </a:solidFill>
+                <a:latin typeface="Times New Roman" panose="02020603050405020304" pitchFamily="18" charset="0"/>
+                <a:cs typeface="Times New Roman" panose="02020603050405020304" pitchFamily="18" charset="0"/>
+              </a:rPr>
+              <a:t>Acer saccharum </a:t>
+            </a:r>
+          </a:p>
+          <a:p>
+            <a:pPr marL="0" marR="0" indent="0" algn="ctr">
               <a:spcBef>
                 <a:spcPts val="0"/>
               </a:spcBef>
@@ -5812,8 +5889,41 @@
                 <a:latin typeface="Times New Roman" panose="02020603050405020304" pitchFamily="18" charset="0"/>
                 <a:cs typeface="Times New Roman" panose="02020603050405020304" pitchFamily="18" charset="0"/>
               </a:rPr>
-              <a:t>Leaf Damage</a:t>
+              <a:t>Leaf </a:t>
             </a:r>
+            <a:r>
+              <a:rPr lang="en-CA" sz="1400" b="1" dirty="0">
+                <a:solidFill>
+                  <a:srgbClr val="000000">
+                    <a:alpha val="100000"/>
+                  </a:srgbClr>
+                </a:solidFill>
+                <a:latin typeface="Times New Roman" panose="02020603050405020304" pitchFamily="18" charset="0"/>
+                <a:cs typeface="Times New Roman" panose="02020603050405020304" pitchFamily="18" charset="0"/>
+              </a:rPr>
+              <a:t>d</a:t>
+            </a:r>
+            <a:r>
+              <a:rPr sz="1400" b="1" dirty="0" err="1">
+                <a:solidFill>
+                  <a:srgbClr val="000000">
+                    <a:alpha val="100000"/>
+                  </a:srgbClr>
+                </a:solidFill>
+                <a:latin typeface="Times New Roman" panose="02020603050405020304" pitchFamily="18" charset="0"/>
+                <a:cs typeface="Times New Roman" panose="02020603050405020304" pitchFamily="18" charset="0"/>
+              </a:rPr>
+              <a:t>amage</a:t>
+            </a:r>
+            <a:endParaRPr sz="1400" b="1" dirty="0">
+              <a:solidFill>
+                <a:srgbClr val="000000">
+                  <a:alpha val="100000"/>
+                </a:srgbClr>
+              </a:solidFill>
+              <a:latin typeface="Times New Roman" panose="02020603050405020304" pitchFamily="18" charset="0"/>
+              <a:cs typeface="Times New Roman" panose="02020603050405020304" pitchFamily="18" charset="0"/>
+            </a:endParaRPr>
           </a:p>
         </p:txBody>
       </p:sp>
@@ -5825,8 +5935,8 @@
         </p:nvSpPr>
         <p:spPr>
           <a:xfrm>
-            <a:off x="4515531" y="6123441"/>
-            <a:ext cx="444855" cy="273522"/>
+            <a:off x="4031181" y="6123441"/>
+            <a:ext cx="1382957" cy="273522"/>
           </a:xfrm>
           <a:custGeom>
             <a:avLst/>
@@ -6053,6 +6163,27 @@
               </a:rPr>
               <a:t>Fern</a:t>
             </a:r>
+            <a:r>
+              <a:rPr lang="en-CA" sz="1400" b="1" dirty="0">
+                <a:solidFill>
+                  <a:srgbClr val="000000">
+                    <a:alpha val="100000"/>
+                  </a:srgbClr>
+                </a:solidFill>
+                <a:latin typeface="Times New Roman" panose="02020603050405020304" pitchFamily="18" charset="0"/>
+                <a:cs typeface="Times New Roman" panose="02020603050405020304" pitchFamily="18" charset="0"/>
+              </a:rPr>
+              <a:t> abundance</a:t>
+            </a:r>
+            <a:endParaRPr sz="1400" b="1" dirty="0">
+              <a:solidFill>
+                <a:srgbClr val="000000">
+                  <a:alpha val="100000"/>
+                </a:srgbClr>
+              </a:solidFill>
+              <a:latin typeface="Times New Roman" panose="02020603050405020304" pitchFamily="18" charset="0"/>
+              <a:cs typeface="Times New Roman" panose="02020603050405020304" pitchFamily="18" charset="0"/>
+            </a:endParaRPr>
           </a:p>
         </p:txBody>
       </p:sp>
@@ -7784,7 +7915,43 @@
                 <a:latin typeface="Times New Roman" panose="02020603050405020304" pitchFamily="18" charset="0"/>
                 <a:cs typeface="Times New Roman" panose="02020603050405020304" pitchFamily="18" charset="0"/>
               </a:rPr>
-              <a:t>General Investment </a:t>
+              <a:t>General </a:t>
+            </a:r>
+            <a:r>
+              <a:rPr lang="en-CA" sz="1400" b="1" dirty="0" err="1">
+                <a:solidFill>
+                  <a:srgbClr val="000000">
+                    <a:alpha val="100000"/>
+                  </a:srgbClr>
+                </a:solidFill>
+                <a:latin typeface="Times New Roman" panose="02020603050405020304" pitchFamily="18" charset="0"/>
+                <a:cs typeface="Times New Roman" panose="02020603050405020304" pitchFamily="18" charset="0"/>
+              </a:rPr>
+              <a:t>i</a:t>
+            </a:r>
+            <a:r>
+              <a:rPr sz="1400" b="1" dirty="0" err="1">
+                <a:solidFill>
+                  <a:srgbClr val="000000">
+                    <a:alpha val="100000"/>
+                  </a:srgbClr>
+                </a:solidFill>
+                <a:latin typeface="Times New Roman" panose="02020603050405020304" pitchFamily="18" charset="0"/>
+                <a:cs typeface="Times New Roman" panose="02020603050405020304" pitchFamily="18" charset="0"/>
+              </a:rPr>
+              <a:t>nvestment</a:t>
+            </a:r>
+            <a:r>
+              <a:rPr sz="1400" b="1" dirty="0">
+                <a:solidFill>
+                  <a:srgbClr val="000000">
+                    <a:alpha val="100000"/>
+                  </a:srgbClr>
+                </a:solidFill>
+                <a:latin typeface="Times New Roman" panose="02020603050405020304" pitchFamily="18" charset="0"/>
+                <a:cs typeface="Times New Roman" panose="02020603050405020304" pitchFamily="18" charset="0"/>
+              </a:rPr>
+              <a:t> </a:t>
             </a:r>
             <a:endParaRPr lang="en-CA" sz="1400" b="1" dirty="0">
               <a:solidFill>
@@ -8078,7 +8245,43 @@
                 <a:latin typeface="Times New Roman" panose="02020603050405020304" pitchFamily="18" charset="0"/>
                 <a:cs typeface="Times New Roman" panose="02020603050405020304" pitchFamily="18" charset="0"/>
               </a:rPr>
-              <a:t> Investment </a:t>
+              <a:t> </a:t>
+            </a:r>
+            <a:r>
+              <a:rPr lang="en-CA" sz="1400" b="1" dirty="0" err="1">
+                <a:solidFill>
+                  <a:srgbClr val="000000">
+                    <a:alpha val="100000"/>
+                  </a:srgbClr>
+                </a:solidFill>
+                <a:latin typeface="Times New Roman" panose="02020603050405020304" pitchFamily="18" charset="0"/>
+                <a:cs typeface="Times New Roman" panose="02020603050405020304" pitchFamily="18" charset="0"/>
+              </a:rPr>
+              <a:t>i</a:t>
+            </a:r>
+            <a:r>
+              <a:rPr sz="1400" b="1" dirty="0" err="1">
+                <a:solidFill>
+                  <a:srgbClr val="000000">
+                    <a:alpha val="100000"/>
+                  </a:srgbClr>
+                </a:solidFill>
+                <a:latin typeface="Times New Roman" panose="02020603050405020304" pitchFamily="18" charset="0"/>
+                <a:cs typeface="Times New Roman" panose="02020603050405020304" pitchFamily="18" charset="0"/>
+              </a:rPr>
+              <a:t>nvestment</a:t>
+            </a:r>
+            <a:r>
+              <a:rPr sz="1400" b="1" dirty="0">
+                <a:solidFill>
+                  <a:srgbClr val="000000">
+                    <a:alpha val="100000"/>
+                  </a:srgbClr>
+                </a:solidFill>
+                <a:latin typeface="Times New Roman" panose="02020603050405020304" pitchFamily="18" charset="0"/>
+                <a:cs typeface="Times New Roman" panose="02020603050405020304" pitchFamily="18" charset="0"/>
+              </a:rPr>
+              <a:t> </a:t>
             </a:r>
             <a:endParaRPr lang="en-CA" sz="1400" b="1" dirty="0">
               <a:solidFill>

</xml_diff>